<commit_message>
08 Jan 2026 *Web Development: -ReactJS:   -Routing(location.href, UseNavigate) *DSA:   -Longest Substring Without Repeating Characters   -Search a 2D Matrix II   -Search a 2D Matrix
</commit_message>
<xml_diff>
--- a/DSA For Placement/5. Sliding Window - Completed/Sliding Window.pptx
+++ b/DSA For Placement/5. Sliding Window - Completed/Sliding Window.pptx
@@ -269,7 +269,7 @@
           <a:p>
             <a:fld id="{4FFA24E0-ED64-48F8-9E00-C3EE0C30FE8D}" type="datetimeFigureOut">
               <a:rPr lang="en-IN" smtClean="0"/>
-              <a:t>21-11-2025</a:t>
+              <a:t>09-01-2026</a:t>
             </a:fld>
             <a:endParaRPr lang="en-IN"/>
           </a:p>
@@ -469,7 +469,7 @@
           <a:p>
             <a:fld id="{4FFA24E0-ED64-48F8-9E00-C3EE0C30FE8D}" type="datetimeFigureOut">
               <a:rPr lang="en-IN" smtClean="0"/>
-              <a:t>21-11-2025</a:t>
+              <a:t>09-01-2026</a:t>
             </a:fld>
             <a:endParaRPr lang="en-IN"/>
           </a:p>
@@ -679,7 +679,7 @@
           <a:p>
             <a:fld id="{4FFA24E0-ED64-48F8-9E00-C3EE0C30FE8D}" type="datetimeFigureOut">
               <a:rPr lang="en-IN" smtClean="0"/>
-              <a:t>21-11-2025</a:t>
+              <a:t>09-01-2026</a:t>
             </a:fld>
             <a:endParaRPr lang="en-IN"/>
           </a:p>
@@ -879,7 +879,7 @@
           <a:p>
             <a:fld id="{4FFA24E0-ED64-48F8-9E00-C3EE0C30FE8D}" type="datetimeFigureOut">
               <a:rPr lang="en-IN" smtClean="0"/>
-              <a:t>21-11-2025</a:t>
+              <a:t>09-01-2026</a:t>
             </a:fld>
             <a:endParaRPr lang="en-IN"/>
           </a:p>
@@ -1155,7 +1155,7 @@
           <a:p>
             <a:fld id="{4FFA24E0-ED64-48F8-9E00-C3EE0C30FE8D}" type="datetimeFigureOut">
               <a:rPr lang="en-IN" smtClean="0"/>
-              <a:t>21-11-2025</a:t>
+              <a:t>09-01-2026</a:t>
             </a:fld>
             <a:endParaRPr lang="en-IN"/>
           </a:p>
@@ -1423,7 +1423,7 @@
           <a:p>
             <a:fld id="{4FFA24E0-ED64-48F8-9E00-C3EE0C30FE8D}" type="datetimeFigureOut">
               <a:rPr lang="en-IN" smtClean="0"/>
-              <a:t>21-11-2025</a:t>
+              <a:t>09-01-2026</a:t>
             </a:fld>
             <a:endParaRPr lang="en-IN"/>
           </a:p>
@@ -1838,7 +1838,7 @@
           <a:p>
             <a:fld id="{4FFA24E0-ED64-48F8-9E00-C3EE0C30FE8D}" type="datetimeFigureOut">
               <a:rPr lang="en-IN" smtClean="0"/>
-              <a:t>21-11-2025</a:t>
+              <a:t>09-01-2026</a:t>
             </a:fld>
             <a:endParaRPr lang="en-IN"/>
           </a:p>
@@ -1980,7 +1980,7 @@
           <a:p>
             <a:fld id="{4FFA24E0-ED64-48F8-9E00-C3EE0C30FE8D}" type="datetimeFigureOut">
               <a:rPr lang="en-IN" smtClean="0"/>
-              <a:t>21-11-2025</a:t>
+              <a:t>09-01-2026</a:t>
             </a:fld>
             <a:endParaRPr lang="en-IN"/>
           </a:p>
@@ -2093,7 +2093,7 @@
           <a:p>
             <a:fld id="{4FFA24E0-ED64-48F8-9E00-C3EE0C30FE8D}" type="datetimeFigureOut">
               <a:rPr lang="en-IN" smtClean="0"/>
-              <a:t>21-11-2025</a:t>
+              <a:t>09-01-2026</a:t>
             </a:fld>
             <a:endParaRPr lang="en-IN"/>
           </a:p>
@@ -2406,7 +2406,7 @@
           <a:p>
             <a:fld id="{4FFA24E0-ED64-48F8-9E00-C3EE0C30FE8D}" type="datetimeFigureOut">
               <a:rPr lang="en-IN" smtClean="0"/>
-              <a:t>21-11-2025</a:t>
+              <a:t>09-01-2026</a:t>
             </a:fld>
             <a:endParaRPr lang="en-IN"/>
           </a:p>
@@ -2695,7 +2695,7 @@
           <a:p>
             <a:fld id="{4FFA24E0-ED64-48F8-9E00-C3EE0C30FE8D}" type="datetimeFigureOut">
               <a:rPr lang="en-IN" smtClean="0"/>
-              <a:t>21-11-2025</a:t>
+              <a:t>09-01-2026</a:t>
             </a:fld>
             <a:endParaRPr lang="en-IN"/>
           </a:p>
@@ -2938,7 +2938,7 @@
           <a:p>
             <a:fld id="{4FFA24E0-ED64-48F8-9E00-C3EE0C30FE8D}" type="datetimeFigureOut">
               <a:rPr lang="en-IN" smtClean="0"/>
-              <a:t>21-11-2025</a:t>
+              <a:t>09-01-2026</a:t>
             </a:fld>
             <a:endParaRPr lang="en-IN"/>
           </a:p>
@@ -3387,31 +3387,6 @@
           </a:p>
         </p:txBody>
       </p:sp>
-      <p:sp>
-        <p:nvSpPr>
-          <p:cNvPr id="3" name="Subtitle 2">
-            <a:extLst>
-              <a:ext uri="{FF2B5EF4-FFF2-40B4-BE49-F238E27FC236}">
-                <a16:creationId xmlns:a16="http://schemas.microsoft.com/office/drawing/2014/main" id="{746D5A13-6D5A-41A1-A415-4824B79A592F}"/>
-              </a:ext>
-            </a:extLst>
-          </p:cNvPr>
-          <p:cNvSpPr>
-            <a:spLocks noGrp="1"/>
-          </p:cNvSpPr>
-          <p:nvPr>
-            <p:ph type="subTitle" idx="1"/>
-          </p:nvPr>
-        </p:nvSpPr>
-        <p:spPr/>
-        <p:txBody>
-          <a:bodyPr/>
-          <a:lstStyle/>
-          <a:p>
-            <a:endParaRPr lang="en-IN"/>
-          </a:p>
-        </p:txBody>
-      </p:sp>
     </p:spTree>
     <p:extLst>
       <p:ext uri="{BB962C8B-B14F-4D97-AF65-F5344CB8AC3E}">

</xml_diff>